<commit_message>
initial lamda event (for terminal state event) never fired -- fix appears to show scikits_odes outperforming simupy for the first 4 cases
</commit_message>
<xml_diff>
--- a/design/condor.pptx
+++ b/design/condor.pptx
@@ -3849,14 +3849,14 @@
             <p:ph idx="1"/>
             <p:extLst>
               <p:ext uri="{D42A27DB-BD31-4B8C-83A1-F6EECF244321}">
-                <p14:modId xmlns:p14="http://schemas.microsoft.com/office/powerpoint/2010/main" val="2319791558"/>
+                <p14:modId xmlns:p14="http://schemas.microsoft.com/office/powerpoint/2010/main" val="1974391809"/>
               </p:ext>
             </p:extLst>
           </p:nvPr>
         </p:nvGraphicFramePr>
         <p:xfrm>
           <a:off x="4772024" y="1297458"/>
-          <a:ext cx="7275814" cy="4636789"/>
+          <a:ext cx="7275814" cy="4976480"/>
         </p:xfrm>
         <a:graphic>
           <a:graphicData uri="http://schemas.openxmlformats.org/drawingml/2006/table">
@@ -4201,18 +4201,38 @@
                     <a:lstStyle/>
                     <a:p>
                       <a:r>
-                        <a:rPr lang="en-US" dirty="0" err="1"/>
+                        <a:rPr lang="en-US" strike="sngStrike" dirty="0" err="1"/>
                         <a:t>implicit_output</a:t>
                       </a:r>
                       <a:r>
-                        <a:rPr lang="en-US" dirty="0"/>
+                        <a:rPr lang="en-US" strike="sngStrike" dirty="0"/>
                         <a:t> </a:t>
                       </a:r>
                       <a:r>
-                        <a:rPr lang="en-US" dirty="0" err="1"/>
+                        <a:rPr lang="en-US" strike="sngStrike" dirty="0" err="1"/>
                         <a:t>explicit_output</a:t>
                       </a:r>
-                      <a:endParaRPr lang="en-US" dirty="0"/>
+                      <a:endParaRPr lang="en-US" strike="sngStrike" dirty="0"/>
+                    </a:p>
+                    <a:p>
+                      <a:r>
+                        <a:rPr lang="en-US" dirty="0">
+                          <a:solidFill>
+                            <a:srgbClr val="FF0000"/>
+                          </a:solidFill>
+                        </a:rPr>
+                        <a:t>variable</a:t>
+                      </a:r>
+                    </a:p>
+                    <a:p>
+                      <a:r>
+                        <a:rPr lang="en-US" dirty="0">
+                          <a:solidFill>
+                            <a:srgbClr val="FF0000"/>
+                          </a:solidFill>
+                        </a:rPr>
+                        <a:t>output</a:t>
+                      </a:r>
                     </a:p>
                   </a:txBody>
                   <a:tcPr/>
@@ -4278,6 +4298,16 @@
                       <a:r>
                         <a:rPr lang="en-US" dirty="0"/>
                         <a:t>variable</a:t>
+                      </a:r>
+                    </a:p>
+                    <a:p>
+                      <a:r>
+                        <a:rPr lang="en-US" dirty="0">
+                          <a:solidFill>
+                            <a:srgbClr val="FF0000"/>
+                          </a:solidFill>
+                        </a:rPr>
+                        <a:t>output</a:t>
                       </a:r>
                     </a:p>
                   </a:txBody>
@@ -4357,8 +4387,12 @@
                     <a:lstStyle/>
                     <a:p>
                       <a:r>
+                        <a:rPr lang="en-US" strike="sngStrike" dirty="0" err="1"/>
+                        <a:t>trajectory_</a:t>
+                      </a:r>
+                      <a:r>
                         <a:rPr lang="en-US" dirty="0" err="1"/>
-                        <a:t>trajectory_output</a:t>
+                        <a:t>output</a:t>
                       </a:r>
                       <a:endParaRPr lang="en-US" dirty="0"/>
                     </a:p>

</xml_diff>

<commit_message>
modified scikits.odes to allow changing max_step_size, using ufunc out doesn't seem to improve speed, other placeholder for debugging
</commit_message>
<xml_diff>
--- a/design/condor.pptx
+++ b/design/condor.pptx
@@ -15,8 +15,8 @@
     <p:sldId id="263" r:id="rId9"/>
     <p:sldId id="267" r:id="rId10"/>
     <p:sldId id="268" r:id="rId11"/>
-    <p:sldId id="269" r:id="rId12"/>
-    <p:sldId id="264" r:id="rId13"/>
+    <p:sldId id="264" r:id="rId12"/>
+    <p:sldId id="270" r:id="rId13"/>
     <p:sldId id="265" r:id="rId14"/>
     <p:sldId id="266" r:id="rId15"/>
   </p:sldIdLst>
@@ -117,6 +117,11 @@
       </a:defRPr>
     </a:lvl9pPr>
   </p:defaultTextStyle>
+  <p:extLst>
+    <p:ext uri="{EFAFB233-063F-42B5-8137-9DF3F51BA10A}">
+      <p15:sldGuideLst xmlns:p15="http://schemas.microsoft.com/office/powerpoint/2012/main"/>
+    </p:ext>
+  </p:extLst>
 </p:presentation>
 </file>
 
@@ -267,7 +272,7 @@
           <a:p>
             <a:fld id="{82C24D50-B70E-6E43-A434-A378B909BA98}" type="datetimeFigureOut">
               <a:rPr lang="en-US" smtClean="0"/>
-              <a:t>7/9/23</a:t>
+              <a:t>7/21/23</a:t>
             </a:fld>
             <a:endParaRPr lang="en-US"/>
           </a:p>
@@ -465,7 +470,7 @@
           <a:p>
             <a:fld id="{82C24D50-B70E-6E43-A434-A378B909BA98}" type="datetimeFigureOut">
               <a:rPr lang="en-US" smtClean="0"/>
-              <a:t>7/9/23</a:t>
+              <a:t>7/21/23</a:t>
             </a:fld>
             <a:endParaRPr lang="en-US"/>
           </a:p>
@@ -673,7 +678,7 @@
           <a:p>
             <a:fld id="{82C24D50-B70E-6E43-A434-A378B909BA98}" type="datetimeFigureOut">
               <a:rPr lang="en-US" smtClean="0"/>
-              <a:t>7/9/23</a:t>
+              <a:t>7/21/23</a:t>
             </a:fld>
             <a:endParaRPr lang="en-US"/>
           </a:p>
@@ -871,7 +876,7 @@
           <a:p>
             <a:fld id="{82C24D50-B70E-6E43-A434-A378B909BA98}" type="datetimeFigureOut">
               <a:rPr lang="en-US" smtClean="0"/>
-              <a:t>7/9/23</a:t>
+              <a:t>7/21/23</a:t>
             </a:fld>
             <a:endParaRPr lang="en-US"/>
           </a:p>
@@ -1146,7 +1151,7 @@
           <a:p>
             <a:fld id="{82C24D50-B70E-6E43-A434-A378B909BA98}" type="datetimeFigureOut">
               <a:rPr lang="en-US" smtClean="0"/>
-              <a:t>7/9/23</a:t>
+              <a:t>7/21/23</a:t>
             </a:fld>
             <a:endParaRPr lang="en-US"/>
           </a:p>
@@ -1411,7 +1416,7 @@
           <a:p>
             <a:fld id="{82C24D50-B70E-6E43-A434-A378B909BA98}" type="datetimeFigureOut">
               <a:rPr lang="en-US" smtClean="0"/>
-              <a:t>7/9/23</a:t>
+              <a:t>7/21/23</a:t>
             </a:fld>
             <a:endParaRPr lang="en-US"/>
           </a:p>
@@ -1823,7 +1828,7 @@
           <a:p>
             <a:fld id="{82C24D50-B70E-6E43-A434-A378B909BA98}" type="datetimeFigureOut">
               <a:rPr lang="en-US" smtClean="0"/>
-              <a:t>7/9/23</a:t>
+              <a:t>7/21/23</a:t>
             </a:fld>
             <a:endParaRPr lang="en-US"/>
           </a:p>
@@ -1964,7 +1969,7 @@
           <a:p>
             <a:fld id="{82C24D50-B70E-6E43-A434-A378B909BA98}" type="datetimeFigureOut">
               <a:rPr lang="en-US" smtClean="0"/>
-              <a:t>7/9/23</a:t>
+              <a:t>7/21/23</a:t>
             </a:fld>
             <a:endParaRPr lang="en-US"/>
           </a:p>
@@ -2077,7 +2082,7 @@
           <a:p>
             <a:fld id="{82C24D50-B70E-6E43-A434-A378B909BA98}" type="datetimeFigureOut">
               <a:rPr lang="en-US" smtClean="0"/>
-              <a:t>7/9/23</a:t>
+              <a:t>7/21/23</a:t>
             </a:fld>
             <a:endParaRPr lang="en-US"/>
           </a:p>
@@ -2388,7 +2393,7 @@
           <a:p>
             <a:fld id="{82C24D50-B70E-6E43-A434-A378B909BA98}" type="datetimeFigureOut">
               <a:rPr lang="en-US" smtClean="0"/>
-              <a:t>7/9/23</a:t>
+              <a:t>7/21/23</a:t>
             </a:fld>
             <a:endParaRPr lang="en-US"/>
           </a:p>
@@ -2676,7 +2681,7 @@
           <a:p>
             <a:fld id="{82C24D50-B70E-6E43-A434-A378B909BA98}" type="datetimeFigureOut">
               <a:rPr lang="en-US" smtClean="0"/>
-              <a:t>7/9/23</a:t>
+              <a:t>7/21/23</a:t>
             </a:fld>
             <a:endParaRPr lang="en-US"/>
           </a:p>
@@ -2917,7 +2922,7 @@
           <a:p>
             <a:fld id="{82C24D50-B70E-6E43-A434-A378B909BA98}" type="datetimeFigureOut">
               <a:rPr lang="en-US" smtClean="0"/>
-              <a:t>7/9/23</a:t>
+              <a:t>7/21/23</a:t>
             </a:fld>
             <a:endParaRPr lang="en-US"/>
           </a:p>
@@ -3642,89 +3647,6 @@
           <p:cNvPr id="2" name="Title 1">
             <a:extLst>
               <a:ext uri="{FF2B5EF4-FFF2-40B4-BE49-F238E27FC236}">
-                <a16:creationId xmlns:a16="http://schemas.microsoft.com/office/drawing/2014/main" id="{0F994556-3671-80AE-F917-ECDD9B0763AA}"/>
-              </a:ext>
-            </a:extLst>
-          </p:cNvPr>
-          <p:cNvSpPr>
-            <a:spLocks noGrp="1"/>
-          </p:cNvSpPr>
-          <p:nvPr>
-            <p:ph type="title"/>
-          </p:nvPr>
-        </p:nvSpPr>
-        <p:spPr/>
-        <p:txBody>
-          <a:bodyPr/>
-          <a:lstStyle/>
-          <a:p>
-            <a:endParaRPr lang="en-US"/>
-          </a:p>
-        </p:txBody>
-      </p:sp>
-      <p:sp>
-        <p:nvSpPr>
-          <p:cNvPr id="3" name="Content Placeholder 2">
-            <a:extLst>
-              <a:ext uri="{FF2B5EF4-FFF2-40B4-BE49-F238E27FC236}">
-                <a16:creationId xmlns:a16="http://schemas.microsoft.com/office/drawing/2014/main" id="{F132F232-6851-386C-298F-F3F85B184588}"/>
-              </a:ext>
-            </a:extLst>
-          </p:cNvPr>
-          <p:cNvSpPr>
-            <a:spLocks noGrp="1"/>
-          </p:cNvSpPr>
-          <p:nvPr>
-            <p:ph idx="1"/>
-          </p:nvPr>
-        </p:nvSpPr>
-        <p:spPr/>
-        <p:txBody>
-          <a:bodyPr/>
-          <a:lstStyle/>
-          <a:p>
-            <a:r>
-              <a:rPr lang="en-US" dirty="0"/>
-              <a:t>Implementations</a:t>
-            </a:r>
-          </a:p>
-        </p:txBody>
-      </p:sp>
-    </p:spTree>
-    <p:extLst>
-      <p:ext uri="{BB962C8B-B14F-4D97-AF65-F5344CB8AC3E}">
-        <p14:creationId xmlns:p14="http://schemas.microsoft.com/office/powerpoint/2010/main" val="711145115"/>
-      </p:ext>
-    </p:extLst>
-  </p:cSld>
-  <p:clrMapOvr>
-    <a:masterClrMapping/>
-  </p:clrMapOvr>
-</p:sld>
-</file>
-
-<file path=ppt/slides/slide12.xml><?xml version="1.0" encoding="utf-8"?>
-<p:sld xmlns:a="http://schemas.openxmlformats.org/drawingml/2006/main" xmlns:r="http://schemas.openxmlformats.org/officeDocument/2006/relationships" xmlns:p="http://schemas.openxmlformats.org/presentationml/2006/main">
-  <p:cSld>
-    <p:spTree>
-      <p:nvGrpSpPr>
-        <p:cNvPr id="1" name=""/>
-        <p:cNvGrpSpPr/>
-        <p:nvPr/>
-      </p:nvGrpSpPr>
-      <p:grpSpPr>
-        <a:xfrm>
-          <a:off x="0" y="0"/>
-          <a:ext cx="0" cy="0"/>
-          <a:chOff x="0" y="0"/>
-          <a:chExt cx="0" cy="0"/>
-        </a:xfrm>
-      </p:grpSpPr>
-      <p:sp>
-        <p:nvSpPr>
-          <p:cNvPr id="2" name="Title 1">
-            <a:extLst>
-              <a:ext uri="{FF2B5EF4-FFF2-40B4-BE49-F238E27FC236}">
                 <a16:creationId xmlns:a16="http://schemas.microsoft.com/office/drawing/2014/main" id="{FE6D9A2D-06E5-48F6-1577-770301591992}"/>
               </a:ext>
             </a:extLst>
@@ -3849,14 +3771,14 @@
             <p:ph idx="1"/>
             <p:extLst>
               <p:ext uri="{D42A27DB-BD31-4B8C-83A1-F6EECF244321}">
-                <p14:modId xmlns:p14="http://schemas.microsoft.com/office/powerpoint/2010/main" val="1974391809"/>
+                <p14:modId xmlns:p14="http://schemas.microsoft.com/office/powerpoint/2010/main" val="2227009790"/>
               </p:ext>
             </p:extLst>
           </p:nvPr>
         </p:nvGraphicFramePr>
         <p:xfrm>
           <a:off x="4772024" y="1297458"/>
-          <a:ext cx="7275814" cy="4976480"/>
+          <a:ext cx="7275814" cy="5124663"/>
         </p:xfrm>
         <a:graphic>
           <a:graphicData uri="http://schemas.openxmlformats.org/drawingml/2006/table">
@@ -3865,21 +3787,21 @@
                 <a:tableStyleId>{5C22544A-7EE6-4342-B048-85BDC9FD1C3A}</a:tableStyleId>
               </a:tblPr>
               <a:tblGrid>
-                <a:gridCol w="2239228">
+                <a:gridCol w="2298732">
                   <a:extLst>
                     <a:ext uri="{9D8B030D-6E8A-4147-A177-3AD203B41FA5}">
                       <a16:colId xmlns:a16="http://schemas.microsoft.com/office/drawing/2014/main" val="3785575868"/>
                     </a:ext>
                   </a:extLst>
                 </a:gridCol>
-                <a:gridCol w="1168921">
+                <a:gridCol w="1358020">
                   <a:extLst>
                     <a:ext uri="{9D8B030D-6E8A-4147-A177-3AD203B41FA5}">
                       <a16:colId xmlns:a16="http://schemas.microsoft.com/office/drawing/2014/main" val="831498153"/>
                     </a:ext>
                   </a:extLst>
                 </a:gridCol>
-                <a:gridCol w="1924256">
+                <a:gridCol w="1675653">
                   <a:extLst>
                     <a:ext uri="{9D8B030D-6E8A-4147-A177-3AD203B41FA5}">
                       <a16:colId xmlns:a16="http://schemas.microsoft.com/office/drawing/2014/main" val="1483990506"/>
@@ -4118,8 +4040,18 @@
                     <a:lstStyle/>
                     <a:p>
                       <a:r>
-                        <a:rPr lang="en-US" dirty="0"/>
+                        <a:rPr lang="en-US" strike="sngStrike" dirty="0"/>
                         <a:t>input</a:t>
+                      </a:r>
+                    </a:p>
+                    <a:p>
+                      <a:r>
+                        <a:rPr lang="en-US" dirty="0">
+                          <a:solidFill>
+                            <a:srgbClr val="FF0000"/>
+                          </a:solidFill>
+                        </a:rPr>
+                        <a:t>parameter</a:t>
                       </a:r>
                     </a:p>
                   </a:txBody>
@@ -4344,6 +4276,16 @@
                         <a:t>parameter</a:t>
                       </a:r>
                     </a:p>
+                    <a:p>
+                      <a:r>
+                        <a:rPr lang="en-US" dirty="0">
+                          <a:solidFill>
+                            <a:srgbClr val="FF0000"/>
+                          </a:solidFill>
+                        </a:rPr>
+                        <a:t>constants?</a:t>
+                      </a:r>
+                    </a:p>
                   </a:txBody>
                   <a:tcPr/>
                 </a:tc>
@@ -4371,9 +4313,10 @@
                     </a:p>
                     <a:p>
                       <a:r>
-                        <a:rPr lang="en-US" dirty="0"/>
-                        <a:t>event update</a:t>
+                        <a:rPr lang="en-US" dirty="0" err="1"/>
+                        <a:t>event.update</a:t>
                       </a:r>
+                      <a:endParaRPr lang="en-US" dirty="0"/>
                     </a:p>
                     <a:p>
                       <a:endParaRPr lang="en-US" dirty="0"/>
@@ -4388,13 +4331,36 @@
                     <a:p>
                       <a:r>
                         <a:rPr lang="en-US" strike="sngStrike" dirty="0" err="1"/>
-                        <a:t>trajectory_</a:t>
+                        <a:t>trajectory_output</a:t>
                       </a:r>
+                      <a:endParaRPr lang="en-US" strike="sngStrike" dirty="0"/>
+                    </a:p>
+                    <a:p>
+                      <a:pPr marL="0" marR="0" lvl="0" indent="0" algn="l" defTabSz="914400" rtl="0" eaLnBrk="1" fontAlgn="auto" latinLnBrk="0" hangingPunct="1">
+                        <a:lnSpc>
+                          <a:spcPct val="100000"/>
+                        </a:lnSpc>
+                        <a:spcBef>
+                          <a:spcPts val="0"/>
+                        </a:spcBef>
+                        <a:spcAft>
+                          <a:spcPts val="0"/>
+                        </a:spcAft>
+                        <a:buClrTx/>
+                        <a:buSzTx/>
+                        <a:buFontTx/>
+                        <a:buNone/>
+                        <a:tabLst/>
+                        <a:defRPr/>
+                      </a:pPr>
                       <a:r>
-                        <a:rPr lang="en-US" dirty="0" err="1"/>
+                        <a:rPr lang="en-US" dirty="0">
+                          <a:solidFill>
+                            <a:srgbClr val="FF0000"/>
+                          </a:solidFill>
+                        </a:rPr>
                         <a:t>output</a:t>
                       </a:r>
-                      <a:endParaRPr lang="en-US" dirty="0"/>
                     </a:p>
                   </a:txBody>
                   <a:tcPr/>
@@ -4413,6 +4379,236 @@
     <p:extLst>
       <p:ext uri="{BB962C8B-B14F-4D97-AF65-F5344CB8AC3E}">
         <p14:creationId xmlns:p14="http://schemas.microsoft.com/office/powerpoint/2010/main" val="642209958"/>
+      </p:ext>
+    </p:extLst>
+  </p:cSld>
+  <p:clrMapOvr>
+    <a:masterClrMapping/>
+  </p:clrMapOvr>
+</p:sld>
+</file>
+
+<file path=ppt/slides/slide12.xml><?xml version="1.0" encoding="utf-8"?>
+<p:sld xmlns:a="http://schemas.openxmlformats.org/drawingml/2006/main" xmlns:r="http://schemas.openxmlformats.org/officeDocument/2006/relationships" xmlns:p="http://schemas.openxmlformats.org/presentationml/2006/main">
+  <p:cSld>
+    <p:spTree>
+      <p:nvGrpSpPr>
+        <p:cNvPr id="1" name=""/>
+        <p:cNvGrpSpPr/>
+        <p:nvPr/>
+      </p:nvGrpSpPr>
+      <p:grpSpPr>
+        <a:xfrm>
+          <a:off x="0" y="0"/>
+          <a:ext cx="0" cy="0"/>
+          <a:chOff x="0" y="0"/>
+          <a:chExt cx="0" cy="0"/>
+        </a:xfrm>
+      </p:grpSpPr>
+      <p:sp>
+        <p:nvSpPr>
+          <p:cNvPr id="5" name="Title 4">
+            <a:extLst>
+              <a:ext uri="{FF2B5EF4-FFF2-40B4-BE49-F238E27FC236}">
+                <a16:creationId xmlns:a16="http://schemas.microsoft.com/office/drawing/2014/main" id="{213020FC-B719-5416-C20F-A4695FA1B3D8}"/>
+              </a:ext>
+            </a:extLst>
+          </p:cNvPr>
+          <p:cNvSpPr>
+            <a:spLocks noGrp="1"/>
+          </p:cNvSpPr>
+          <p:nvPr>
+            <p:ph type="title"/>
+          </p:nvPr>
+        </p:nvSpPr>
+        <p:spPr/>
+        <p:txBody>
+          <a:bodyPr/>
+          <a:lstStyle/>
+          <a:p>
+            <a:r>
+              <a:rPr lang="en-US" dirty="0"/>
+              <a:t>Performance Considerations for Trajectory</a:t>
+            </a:r>
+          </a:p>
+        </p:txBody>
+      </p:sp>
+      <p:sp>
+        <p:nvSpPr>
+          <p:cNvPr id="6" name="Content Placeholder 5">
+            <a:extLst>
+              <a:ext uri="{FF2B5EF4-FFF2-40B4-BE49-F238E27FC236}">
+                <a16:creationId xmlns:a16="http://schemas.microsoft.com/office/drawing/2014/main" id="{F7AE7EE5-6AD7-75ED-D683-8B5C46276C4B}"/>
+              </a:ext>
+            </a:extLst>
+          </p:cNvPr>
+          <p:cNvSpPr>
+            <a:spLocks noGrp="1"/>
+          </p:cNvSpPr>
+          <p:nvPr>
+            <p:ph idx="1"/>
+          </p:nvPr>
+        </p:nvSpPr>
+        <p:spPr>
+          <a:xfrm>
+            <a:off x="838200" y="1834678"/>
+            <a:ext cx="10515600" cy="4351338"/>
+          </a:xfrm>
+        </p:spPr>
+        <p:txBody>
+          <a:bodyPr>
+            <a:normAutofit fontScale="62500" lnSpcReduction="20000"/>
+          </a:bodyPr>
+          <a:lstStyle/>
+          <a:p>
+            <a:r>
+              <a:rPr lang="en-US" dirty="0"/>
+              <a:t>Moved to </a:t>
+            </a:r>
+            <a:r>
+              <a:rPr lang="en-US" dirty="0" err="1"/>
+              <a:t>scikits.odes</a:t>
+            </a:r>
+            <a:r>
+              <a:rPr lang="en-US" dirty="0"/>
+              <a:t> CVODE, an implicit solver; implicit may generally be slower but more accurate than explicit? but faster per accuracy? see discussion</a:t>
+            </a:r>
+            <a:r>
+              <a:rPr lang="en-US" baseline="-25000" dirty="0">
+                <a:hlinkClick r:id="rId2"/>
+              </a:rPr>
+              <a:t>://github.com/bmcage/odes/issues/127#issuecomment-923782240</a:t>
+            </a:r>
+            <a:r>
+              <a:rPr lang="en-US" dirty="0"/>
+              <a:t>. </a:t>
+            </a:r>
+          </a:p>
+          <a:p>
+            <a:r>
+              <a:rPr lang="en-US" dirty="0"/>
+              <a:t>May be able to use state ordering so banded </a:t>
+            </a:r>
+            <a:r>
+              <a:rPr lang="en-US" dirty="0" err="1"/>
+              <a:t>jacobian</a:t>
+            </a:r>
+            <a:r>
+              <a:rPr lang="en-US" dirty="0"/>
+              <a:t> can be used. Other solver configuration options may improve performance as well.</a:t>
+            </a:r>
+          </a:p>
+          <a:p>
+            <a:r>
+              <a:rPr lang="en-US" dirty="0"/>
+              <a:t>Implicit means iterative solution at every time step </a:t>
+            </a:r>
+            <a:r>
+              <a:rPr lang="en-US" dirty="0">
+                <a:sym typeface="Wingdings" pitchFamily="2" charset="2"/>
+              </a:rPr>
+              <a:t> solvers (</a:t>
+            </a:r>
+            <a:r>
+              <a:rPr lang="en-US" dirty="0" err="1">
+                <a:sym typeface="Wingdings" pitchFamily="2" charset="2"/>
+              </a:rPr>
+              <a:t>AlgebraicSystem</a:t>
+            </a:r>
+            <a:r>
+              <a:rPr lang="en-US" dirty="0">
+                <a:sym typeface="Wingdings" pitchFamily="2" charset="2"/>
+              </a:rPr>
+              <a:t> or </a:t>
+            </a:r>
+            <a:r>
+              <a:rPr lang="en-US" dirty="0" err="1">
+                <a:sym typeface="Wingdings" pitchFamily="2" charset="2"/>
+              </a:rPr>
+              <a:t>OptimizationProblem</a:t>
+            </a:r>
+            <a:r>
+              <a:rPr lang="en-US" dirty="0">
+                <a:sym typeface="Wingdings" pitchFamily="2" charset="2"/>
+              </a:rPr>
+              <a:t>) for control will likely be worse! They probably need solution conditions lifted to DAE residual. </a:t>
+            </a:r>
+          </a:p>
+          <a:p>
+            <a:r>
+              <a:rPr lang="en-US" dirty="0"/>
+              <a:t>Maybe add explicit solver wrapper following new API. New API is well-organized &amp; can likely wrap </a:t>
+            </a:r>
+            <a:r>
+              <a:rPr lang="en-US" dirty="0" err="1"/>
+              <a:t>explicit+events</a:t>
+            </a:r>
+            <a:r>
+              <a:rPr lang="en-US" dirty="0"/>
+              <a:t> and sundials CVODES/IDA relatively easily. </a:t>
+            </a:r>
+            <a:r>
+              <a:rPr lang="en-US" dirty="0" err="1"/>
+              <a:t>SimuPy</a:t>
+            </a:r>
+            <a:r>
+              <a:rPr lang="en-US" dirty="0"/>
+              <a:t> (explicit solver) version had problems for later orbital problems even though first orbital problem ~twice as fast (consistent with </a:t>
+            </a:r>
+            <a:r>
+              <a:rPr lang="en-US" dirty="0" err="1"/>
+              <a:t>bmcage’s</a:t>
+            </a:r>
+            <a:r>
+              <a:rPr lang="en-US" dirty="0"/>
+              <a:t> optimized example in discussion). Not sure if explicit issues </a:t>
+            </a:r>
+            <a:r>
+              <a:rPr lang="en-US"/>
+              <a:t>for later orbital </a:t>
+            </a:r>
+            <a:r>
+              <a:rPr lang="en-US" dirty="0"/>
+              <a:t>resolved by time-yielding</a:t>
+            </a:r>
+          </a:p>
+          <a:p>
+            <a:r>
+              <a:rPr lang="en-US" dirty="0">
+                <a:sym typeface="Wingdings" pitchFamily="2" charset="2"/>
+              </a:rPr>
+              <a:t>Modes definitely need </a:t>
+            </a:r>
+            <a:r>
+              <a:rPr lang="en-US" dirty="0" err="1">
+                <a:sym typeface="Wingdings" pitchFamily="2" charset="2"/>
+              </a:rPr>
+              <a:t>if_else</a:t>
+            </a:r>
+            <a:r>
+              <a:rPr lang="en-US" dirty="0">
+                <a:sym typeface="Wingdings" pitchFamily="2" charset="2"/>
+              </a:rPr>
+              <a:t> control branch instead of *float(bool) for explicit solver. Lifted DAE approach may be less important (although number of residuals may change…)</a:t>
+            </a:r>
+          </a:p>
+          <a:p>
+            <a:r>
+              <a:rPr lang="en-US" dirty="0">
+                <a:sym typeface="Wingdings" pitchFamily="2" charset="2"/>
+              </a:rPr>
+              <a:t>Use the built-in sensitivity method of IDAS/CVODES for the continuous portions, then SGM equations for discontinuities. May be able to minimize storage requirements/accuracy</a:t>
+            </a:r>
+          </a:p>
+          <a:p>
+            <a:endParaRPr lang="en-US" dirty="0"/>
+          </a:p>
+        </p:txBody>
+      </p:sp>
+    </p:spTree>
+    <p:extLst>
+      <p:ext uri="{BB962C8B-B14F-4D97-AF65-F5344CB8AC3E}">
+        <p14:creationId xmlns:p14="http://schemas.microsoft.com/office/powerpoint/2010/main" val="3278655454"/>
       </p:ext>
     </p:extLst>
   </p:cSld>

</xml_diff>

<commit_message>
design notes, separating the ODEsolver from system
</commit_message>
<xml_diff>
--- a/design/condor.pptx
+++ b/design/condor.pptx
@@ -4561,15 +4561,7 @@
             </a:r>
             <a:r>
               <a:rPr lang="en-US" dirty="0"/>
-              <a:t> optimized example in discussion). Not sure if explicit issues </a:t>
-            </a:r>
-            <a:r>
-              <a:rPr lang="en-US"/>
-              <a:t>for later orbital </a:t>
-            </a:r>
-            <a:r>
-              <a:rPr lang="en-US" dirty="0"/>
-              <a:t>resolved by time-yielding</a:t>
+              <a:t> optimized example in discussion). Not sure if explicit issues for later orbital resolved by time-yielding</a:t>
             </a:r>
           </a:p>
           <a:p>
@@ -4681,7 +4673,9 @@
         </p:nvSpPr>
         <p:spPr/>
         <p:txBody>
-          <a:bodyPr/>
+          <a:bodyPr>
+            <a:normAutofit fontScale="77500" lnSpcReduction="20000"/>
+          </a:bodyPr>
           <a:lstStyle/>
           <a:p>
             <a:r>
@@ -4708,6 +4702,165 @@
               <a:rPr lang="en-US" dirty="0"/>
               <a:t>higher-level interfaces: settings module</a:t>
             </a:r>
+          </a:p>
+          <a:p>
+            <a:pPr lvl="1"/>
+            <a:r>
+              <a:rPr lang="en-US" dirty="0"/>
+              <a:t>a module can define settings that change the model definition</a:t>
+            </a:r>
+          </a:p>
+          <a:p>
+            <a:pPr lvl="1"/>
+            <a:r>
+              <a:rPr lang="en-US" dirty="0"/>
+              <a:t>Variables that user can set must be defined in a </a:t>
+            </a:r>
+            <a:r>
+              <a:rPr lang="en-US" dirty="0" err="1"/>
+              <a:t>dict</a:t>
+            </a:r>
+            <a:r>
+              <a:rPr lang="en-US" dirty="0"/>
+              <a:t> [</a:t>
+            </a:r>
+            <a:r>
+              <a:rPr lang="en-US" dirty="0" err="1">
+                <a:solidFill>
+                  <a:srgbClr val="FF0000"/>
+                </a:solidFill>
+              </a:rPr>
+              <a:t>SimpleNamespace</a:t>
+            </a:r>
+            <a:r>
+              <a:rPr lang="en-US" dirty="0">
+                <a:solidFill>
+                  <a:srgbClr val="FF0000"/>
+                </a:solidFill>
+              </a:rPr>
+              <a:t>?</a:t>
+            </a:r>
+            <a:r>
+              <a:rPr lang="en-US" dirty="0"/>
+              <a:t>] and passed to </a:t>
+            </a:r>
+            <a:r>
+              <a:rPr lang="en-US" dirty="0" err="1">
+                <a:latin typeface="Andale Mono" panose="020B0509000000000004" pitchFamily="49" charset="0"/>
+              </a:rPr>
+              <a:t>condor.settings.get_settings</a:t>
+            </a:r>
+            <a:r>
+              <a:rPr lang="en-US" dirty="0"/>
+              <a:t>.</a:t>
+            </a:r>
+          </a:p>
+          <a:p>
+            <a:pPr lvl="1"/>
+            <a:r>
+              <a:rPr lang="en-US" dirty="0"/>
+              <a:t>To access the dynamically defined model, use </a:t>
+            </a:r>
+          </a:p>
+          <a:p>
+            <a:pPr marL="457200" lvl="1" indent="0">
+              <a:buNone/>
+            </a:pPr>
+            <a:endParaRPr lang="en-US" dirty="0">
+              <a:latin typeface="Andale Mono" panose="020B0509000000000004" pitchFamily="49" charset="0"/>
+            </a:endParaRPr>
+          </a:p>
+          <a:p>
+            <a:pPr marL="457200" lvl="1" indent="0">
+              <a:buNone/>
+            </a:pPr>
+            <a:r>
+              <a:rPr lang="en-US" dirty="0" err="1">
+                <a:latin typeface="Andale Mono" panose="020B0509000000000004" pitchFamily="49" charset="0"/>
+              </a:rPr>
+              <a:t>module_ref</a:t>
+            </a:r>
+            <a:r>
+              <a:rPr lang="en-US" dirty="0">
+                <a:latin typeface="Andale Mono" panose="020B0509000000000004" pitchFamily="49" charset="0"/>
+              </a:rPr>
+              <a:t> = </a:t>
+            </a:r>
+            <a:r>
+              <a:rPr lang="en-US" dirty="0" err="1">
+                <a:latin typeface="Andale Mono" panose="020B0509000000000004" pitchFamily="49" charset="0"/>
+              </a:rPr>
+              <a:t>condor.settings.get_module</a:t>
+            </a:r>
+            <a:r>
+              <a:rPr lang="en-US" dirty="0">
+                <a:latin typeface="Andale Mono" panose="020B0509000000000004" pitchFamily="49" charset="0"/>
+              </a:rPr>
+              <a:t>(&lt;</a:t>
+            </a:r>
+            <a:r>
+              <a:rPr lang="en-US" dirty="0" err="1">
+                <a:latin typeface="Andale Mono" panose="020B0509000000000004" pitchFamily="49" charset="0"/>
+              </a:rPr>
+              <a:t>path.to.module</a:t>
+            </a:r>
+            <a:r>
+              <a:rPr lang="en-US" dirty="0">
+                <a:latin typeface="Andale Mono" panose="020B0509000000000004" pitchFamily="49" charset="0"/>
+              </a:rPr>
+              <a:t>&gt;, **</a:t>
+            </a:r>
+            <a:r>
+              <a:rPr lang="en-US" dirty="0" err="1">
+                <a:latin typeface="Andale Mono" panose="020B0509000000000004" pitchFamily="49" charset="0"/>
+              </a:rPr>
+              <a:t>user_settings</a:t>
+            </a:r>
+            <a:r>
+              <a:rPr lang="en-US" dirty="0">
+                <a:latin typeface="Andale Mono" panose="020B0509000000000004" pitchFamily="49" charset="0"/>
+              </a:rPr>
+              <a:t>)</a:t>
+            </a:r>
+            <a:r>
+              <a:rPr lang="en-US" baseline="-25000" dirty="0">
+                <a:latin typeface="Andale Mono" panose="020B0509000000000004" pitchFamily="49" charset="0"/>
+              </a:rPr>
+              <a:t> </a:t>
+            </a:r>
+          </a:p>
+          <a:p>
+            <a:pPr marL="457200" lvl="1" indent="0">
+              <a:buNone/>
+            </a:pPr>
+            <a:r>
+              <a:rPr lang="en-US" dirty="0"/>
+              <a:t>instead of </a:t>
+            </a:r>
+          </a:p>
+          <a:p>
+            <a:pPr marL="457200" lvl="1" indent="0">
+              <a:buNone/>
+            </a:pPr>
+            <a:r>
+              <a:rPr lang="en-US" dirty="0">
+                <a:latin typeface="Andale Mono" panose="020B0509000000000004" pitchFamily="49" charset="0"/>
+              </a:rPr>
+              <a:t>import &lt;</a:t>
+            </a:r>
+            <a:r>
+              <a:rPr lang="en-US" dirty="0" err="1">
+                <a:latin typeface="Andale Mono" panose="020B0509000000000004" pitchFamily="49" charset="0"/>
+              </a:rPr>
+              <a:t>path.to.module</a:t>
+            </a:r>
+            <a:r>
+              <a:rPr lang="en-US" dirty="0">
+                <a:latin typeface="Andale Mono" panose="020B0509000000000004" pitchFamily="49" charset="0"/>
+              </a:rPr>
+              <a:t>&gt;</a:t>
+            </a:r>
+            <a:endParaRPr lang="en-US" dirty="0"/>
           </a:p>
           <a:p>
             <a:r>

</xml_diff>

<commit_message>
design ideas, better error message, use trajectory cache
</commit_message>
<xml_diff>
--- a/design/condor.pptx
+++ b/design/condor.pptx
@@ -272,7 +272,7 @@
           <a:p>
             <a:fld id="{82C24D50-B70E-6E43-A434-A378B909BA98}" type="datetimeFigureOut">
               <a:rPr lang="en-US" smtClean="0"/>
-              <a:t>7/21/23</a:t>
+              <a:t>8/4/23</a:t>
             </a:fld>
             <a:endParaRPr lang="en-US"/>
           </a:p>
@@ -470,7 +470,7 @@
           <a:p>
             <a:fld id="{82C24D50-B70E-6E43-A434-A378B909BA98}" type="datetimeFigureOut">
               <a:rPr lang="en-US" smtClean="0"/>
-              <a:t>7/21/23</a:t>
+              <a:t>8/4/23</a:t>
             </a:fld>
             <a:endParaRPr lang="en-US"/>
           </a:p>
@@ -678,7 +678,7 @@
           <a:p>
             <a:fld id="{82C24D50-B70E-6E43-A434-A378B909BA98}" type="datetimeFigureOut">
               <a:rPr lang="en-US" smtClean="0"/>
-              <a:t>7/21/23</a:t>
+              <a:t>8/4/23</a:t>
             </a:fld>
             <a:endParaRPr lang="en-US"/>
           </a:p>
@@ -876,7 +876,7 @@
           <a:p>
             <a:fld id="{82C24D50-B70E-6E43-A434-A378B909BA98}" type="datetimeFigureOut">
               <a:rPr lang="en-US" smtClean="0"/>
-              <a:t>7/21/23</a:t>
+              <a:t>8/4/23</a:t>
             </a:fld>
             <a:endParaRPr lang="en-US"/>
           </a:p>
@@ -1151,7 +1151,7 @@
           <a:p>
             <a:fld id="{82C24D50-B70E-6E43-A434-A378B909BA98}" type="datetimeFigureOut">
               <a:rPr lang="en-US" smtClean="0"/>
-              <a:t>7/21/23</a:t>
+              <a:t>8/4/23</a:t>
             </a:fld>
             <a:endParaRPr lang="en-US"/>
           </a:p>
@@ -1416,7 +1416,7 @@
           <a:p>
             <a:fld id="{82C24D50-B70E-6E43-A434-A378B909BA98}" type="datetimeFigureOut">
               <a:rPr lang="en-US" smtClean="0"/>
-              <a:t>7/21/23</a:t>
+              <a:t>8/4/23</a:t>
             </a:fld>
             <a:endParaRPr lang="en-US"/>
           </a:p>
@@ -1828,7 +1828,7 @@
           <a:p>
             <a:fld id="{82C24D50-B70E-6E43-A434-A378B909BA98}" type="datetimeFigureOut">
               <a:rPr lang="en-US" smtClean="0"/>
-              <a:t>7/21/23</a:t>
+              <a:t>8/4/23</a:t>
             </a:fld>
             <a:endParaRPr lang="en-US"/>
           </a:p>
@@ -1969,7 +1969,7 @@
           <a:p>
             <a:fld id="{82C24D50-B70E-6E43-A434-A378B909BA98}" type="datetimeFigureOut">
               <a:rPr lang="en-US" smtClean="0"/>
-              <a:t>7/21/23</a:t>
+              <a:t>8/4/23</a:t>
             </a:fld>
             <a:endParaRPr lang="en-US"/>
           </a:p>
@@ -2082,7 +2082,7 @@
           <a:p>
             <a:fld id="{82C24D50-B70E-6E43-A434-A378B909BA98}" type="datetimeFigureOut">
               <a:rPr lang="en-US" smtClean="0"/>
-              <a:t>7/21/23</a:t>
+              <a:t>8/4/23</a:t>
             </a:fld>
             <a:endParaRPr lang="en-US"/>
           </a:p>
@@ -2393,7 +2393,7 @@
           <a:p>
             <a:fld id="{82C24D50-B70E-6E43-A434-A378B909BA98}" type="datetimeFigureOut">
               <a:rPr lang="en-US" smtClean="0"/>
-              <a:t>7/21/23</a:t>
+              <a:t>8/4/23</a:t>
             </a:fld>
             <a:endParaRPr lang="en-US"/>
           </a:p>
@@ -2681,7 +2681,7 @@
           <a:p>
             <a:fld id="{82C24D50-B70E-6E43-A434-A378B909BA98}" type="datetimeFigureOut">
               <a:rPr lang="en-US" smtClean="0"/>
-              <a:t>7/21/23</a:t>
+              <a:t>8/4/23</a:t>
             </a:fld>
             <a:endParaRPr lang="en-US"/>
           </a:p>
@@ -2922,7 +2922,7 @@
           <a:p>
             <a:fld id="{82C24D50-B70E-6E43-A434-A378B909BA98}" type="datetimeFigureOut">
               <a:rPr lang="en-US" smtClean="0"/>
-              <a:t>7/21/23</a:t>
+              <a:t>8/4/23</a:t>
             </a:fld>
             <a:endParaRPr lang="en-US"/>
           </a:p>
@@ -4674,7 +4674,7 @@
         <p:spPr/>
         <p:txBody>
           <a:bodyPr>
-            <a:normAutofit fontScale="77500" lnSpcReduction="20000"/>
+            <a:normAutofit fontScale="70000" lnSpcReduction="20000"/>
           </a:bodyPr>
           <a:lstStyle/>
           <a:p>
@@ -4869,7 +4869,14 @@
             </a:r>
           </a:p>
           <a:p>
-            <a:endParaRPr lang="en-US" dirty="0"/>
+            <a:r>
+              <a:rPr lang="en-US" dirty="0">
+                <a:solidFill>
+                  <a:srgbClr val="FF0000"/>
+                </a:solidFill>
+              </a:rPr>
+              <a:t>RENAME: Grammar should be “configure model”</a:t>
+            </a:r>
           </a:p>
           <a:p>
             <a:endParaRPr lang="en-US" dirty="0"/>

</xml_diff>

<commit_message>
dynamic_link allows Condor libraries to dynamically call user models
</commit_message>
<xml_diff>
--- a/design/condor.pptx
+++ b/design/condor.pptx
@@ -275,7 +275,7 @@
           <a:p>
             <a:fld id="{82C24D50-B70E-6E43-A434-A378B909BA98}" type="datetimeFigureOut">
               <a:rPr lang="en-US" smtClean="0"/>
-              <a:t>9/14/23</a:t>
+              <a:t>9/23/23</a:t>
             </a:fld>
             <a:endParaRPr lang="en-US"/>
           </a:p>
@@ -473,7 +473,7 @@
           <a:p>
             <a:fld id="{82C24D50-B70E-6E43-A434-A378B909BA98}" type="datetimeFigureOut">
               <a:rPr lang="en-US" smtClean="0"/>
-              <a:t>9/14/23</a:t>
+              <a:t>9/23/23</a:t>
             </a:fld>
             <a:endParaRPr lang="en-US"/>
           </a:p>
@@ -681,7 +681,7 @@
           <a:p>
             <a:fld id="{82C24D50-B70E-6E43-A434-A378B909BA98}" type="datetimeFigureOut">
               <a:rPr lang="en-US" smtClean="0"/>
-              <a:t>9/14/23</a:t>
+              <a:t>9/23/23</a:t>
             </a:fld>
             <a:endParaRPr lang="en-US"/>
           </a:p>
@@ -879,7 +879,7 @@
           <a:p>
             <a:fld id="{82C24D50-B70E-6E43-A434-A378B909BA98}" type="datetimeFigureOut">
               <a:rPr lang="en-US" smtClean="0"/>
-              <a:t>9/14/23</a:t>
+              <a:t>9/23/23</a:t>
             </a:fld>
             <a:endParaRPr lang="en-US"/>
           </a:p>
@@ -1154,7 +1154,7 @@
           <a:p>
             <a:fld id="{82C24D50-B70E-6E43-A434-A378B909BA98}" type="datetimeFigureOut">
               <a:rPr lang="en-US" smtClean="0"/>
-              <a:t>9/14/23</a:t>
+              <a:t>9/23/23</a:t>
             </a:fld>
             <a:endParaRPr lang="en-US"/>
           </a:p>
@@ -1419,7 +1419,7 @@
           <a:p>
             <a:fld id="{82C24D50-B70E-6E43-A434-A378B909BA98}" type="datetimeFigureOut">
               <a:rPr lang="en-US" smtClean="0"/>
-              <a:t>9/14/23</a:t>
+              <a:t>9/23/23</a:t>
             </a:fld>
             <a:endParaRPr lang="en-US"/>
           </a:p>
@@ -1831,7 +1831,7 @@
           <a:p>
             <a:fld id="{82C24D50-B70E-6E43-A434-A378B909BA98}" type="datetimeFigureOut">
               <a:rPr lang="en-US" smtClean="0"/>
-              <a:t>9/14/23</a:t>
+              <a:t>9/23/23</a:t>
             </a:fld>
             <a:endParaRPr lang="en-US"/>
           </a:p>
@@ -1972,7 +1972,7 @@
           <a:p>
             <a:fld id="{82C24D50-B70E-6E43-A434-A378B909BA98}" type="datetimeFigureOut">
               <a:rPr lang="en-US" smtClean="0"/>
-              <a:t>9/14/23</a:t>
+              <a:t>9/23/23</a:t>
             </a:fld>
             <a:endParaRPr lang="en-US"/>
           </a:p>
@@ -2085,7 +2085,7 @@
           <a:p>
             <a:fld id="{82C24D50-B70E-6E43-A434-A378B909BA98}" type="datetimeFigureOut">
               <a:rPr lang="en-US" smtClean="0"/>
-              <a:t>9/14/23</a:t>
+              <a:t>9/23/23</a:t>
             </a:fld>
             <a:endParaRPr lang="en-US"/>
           </a:p>
@@ -2396,7 +2396,7 @@
           <a:p>
             <a:fld id="{82C24D50-B70E-6E43-A434-A378B909BA98}" type="datetimeFigureOut">
               <a:rPr lang="en-US" smtClean="0"/>
-              <a:t>9/14/23</a:t>
+              <a:t>9/23/23</a:t>
             </a:fld>
             <a:endParaRPr lang="en-US"/>
           </a:p>
@@ -2684,7 +2684,7 @@
           <a:p>
             <a:fld id="{82C24D50-B70E-6E43-A434-A378B909BA98}" type="datetimeFigureOut">
               <a:rPr lang="en-US" smtClean="0"/>
-              <a:t>9/14/23</a:t>
+              <a:t>9/23/23</a:t>
             </a:fld>
             <a:endParaRPr lang="en-US"/>
           </a:p>
@@ -2925,7 +2925,7 @@
           <a:p>
             <a:fld id="{82C24D50-B70E-6E43-A434-A378B909BA98}" type="datetimeFigureOut">
               <a:rPr lang="en-US" smtClean="0"/>
-              <a:t>9/14/23</a:t>
+              <a:t>9/23/23</a:t>
             </a:fld>
             <a:endParaRPr lang="en-US"/>
           </a:p>
@@ -5691,22 +5691,25 @@
           <a:p>
             <a:r>
               <a:rPr lang="en-US" dirty="0"/>
-              <a:t>Refine patterns for programmatic connections – defining sources from </a:t>
+              <a:t>Refine patterns for programmatic connections – defining sources from existing models (use dot access naming with actual object reference or with strings), grouping IO with easy looping, etc. </a:t>
+            </a:r>
+          </a:p>
+          <a:p>
+            <a:r>
+              <a:rPr lang="en-US" dirty="0"/>
+              <a:t>Helper to wrap algebraic/optimization in explicit</a:t>
+            </a:r>
+          </a:p>
+          <a:p>
+            <a:r>
+              <a:rPr lang="en-US" dirty="0"/>
+              <a:t>Leverage bound sub-models to serialize? Can just save all attributes that are bound and/or initialize </a:t>
             </a:r>
             <a:r>
               <a:rPr lang="en-US"/>
-              <a:t>existing models </a:t>
-            </a:r>
-            <a:r>
-              <a:rPr lang="en-US" dirty="0"/>
-              <a:t>(use dot access naming with actual object reference or with strings), grouping IO with easy looping, etc. </a:t>
-            </a:r>
-          </a:p>
-          <a:p>
-            <a:r>
-              <a:rPr lang="en-US" dirty="0"/>
-              <a:t>Helper to wrap algebraic/optimization in explicit</a:t>
-            </a:r>
+              <a:t>solver state</a:t>
+            </a:r>
+            <a:endParaRPr lang="en-US" dirty="0"/>
           </a:p>
           <a:p>
             <a:endParaRPr lang="en-US" dirty="0"/>

</xml_diff>

<commit_message>
some cleanup, if template has placeholder attribute don't replace backend_repr with symbol
</commit_message>
<xml_diff>
--- a/design/condor.pptx
+++ b/design/condor.pptx
@@ -22,6 +22,7 @@
     <p:sldId id="272" r:id="rId16"/>
     <p:sldId id="270" r:id="rId17"/>
     <p:sldId id="266" r:id="rId18"/>
+    <p:sldId id="274" r:id="rId19"/>
   </p:sldIdLst>
   <p:sldSz cx="12192000" cy="6858000"/>
   <p:notesSz cx="6858000" cy="9144000"/>
@@ -275,7 +276,7 @@
           <a:p>
             <a:fld id="{82C24D50-B70E-6E43-A434-A378B909BA98}" type="datetimeFigureOut">
               <a:rPr lang="en-US" smtClean="0"/>
-              <a:t>9/23/23</a:t>
+              <a:t>9/28/23</a:t>
             </a:fld>
             <a:endParaRPr lang="en-US"/>
           </a:p>
@@ -473,7 +474,7 @@
           <a:p>
             <a:fld id="{82C24D50-B70E-6E43-A434-A378B909BA98}" type="datetimeFigureOut">
               <a:rPr lang="en-US" smtClean="0"/>
-              <a:t>9/23/23</a:t>
+              <a:t>9/28/23</a:t>
             </a:fld>
             <a:endParaRPr lang="en-US"/>
           </a:p>
@@ -681,7 +682,7 @@
           <a:p>
             <a:fld id="{82C24D50-B70E-6E43-A434-A378B909BA98}" type="datetimeFigureOut">
               <a:rPr lang="en-US" smtClean="0"/>
-              <a:t>9/23/23</a:t>
+              <a:t>9/28/23</a:t>
             </a:fld>
             <a:endParaRPr lang="en-US"/>
           </a:p>
@@ -879,7 +880,7 @@
           <a:p>
             <a:fld id="{82C24D50-B70E-6E43-A434-A378B909BA98}" type="datetimeFigureOut">
               <a:rPr lang="en-US" smtClean="0"/>
-              <a:t>9/23/23</a:t>
+              <a:t>9/28/23</a:t>
             </a:fld>
             <a:endParaRPr lang="en-US"/>
           </a:p>
@@ -1154,7 +1155,7 @@
           <a:p>
             <a:fld id="{82C24D50-B70E-6E43-A434-A378B909BA98}" type="datetimeFigureOut">
               <a:rPr lang="en-US" smtClean="0"/>
-              <a:t>9/23/23</a:t>
+              <a:t>9/28/23</a:t>
             </a:fld>
             <a:endParaRPr lang="en-US"/>
           </a:p>
@@ -1419,7 +1420,7 @@
           <a:p>
             <a:fld id="{82C24D50-B70E-6E43-A434-A378B909BA98}" type="datetimeFigureOut">
               <a:rPr lang="en-US" smtClean="0"/>
-              <a:t>9/23/23</a:t>
+              <a:t>9/28/23</a:t>
             </a:fld>
             <a:endParaRPr lang="en-US"/>
           </a:p>
@@ -1831,7 +1832,7 @@
           <a:p>
             <a:fld id="{82C24D50-B70E-6E43-A434-A378B909BA98}" type="datetimeFigureOut">
               <a:rPr lang="en-US" smtClean="0"/>
-              <a:t>9/23/23</a:t>
+              <a:t>9/28/23</a:t>
             </a:fld>
             <a:endParaRPr lang="en-US"/>
           </a:p>
@@ -1972,7 +1973,7 @@
           <a:p>
             <a:fld id="{82C24D50-B70E-6E43-A434-A378B909BA98}" type="datetimeFigureOut">
               <a:rPr lang="en-US" smtClean="0"/>
-              <a:t>9/23/23</a:t>
+              <a:t>9/28/23</a:t>
             </a:fld>
             <a:endParaRPr lang="en-US"/>
           </a:p>
@@ -2085,7 +2086,7 @@
           <a:p>
             <a:fld id="{82C24D50-B70E-6E43-A434-A378B909BA98}" type="datetimeFigureOut">
               <a:rPr lang="en-US" smtClean="0"/>
-              <a:t>9/23/23</a:t>
+              <a:t>9/28/23</a:t>
             </a:fld>
             <a:endParaRPr lang="en-US"/>
           </a:p>
@@ -2396,7 +2397,7 @@
           <a:p>
             <a:fld id="{82C24D50-B70E-6E43-A434-A378B909BA98}" type="datetimeFigureOut">
               <a:rPr lang="en-US" smtClean="0"/>
-              <a:t>9/23/23</a:t>
+              <a:t>9/28/23</a:t>
             </a:fld>
             <a:endParaRPr lang="en-US"/>
           </a:p>
@@ -2684,7 +2685,7 @@
           <a:p>
             <a:fld id="{82C24D50-B70E-6E43-A434-A378B909BA98}" type="datetimeFigureOut">
               <a:rPr lang="en-US" smtClean="0"/>
-              <a:t>9/23/23</a:t>
+              <a:t>9/28/23</a:t>
             </a:fld>
             <a:endParaRPr lang="en-US"/>
           </a:p>
@@ -2925,7 +2926,7 @@
           <a:p>
             <a:fld id="{82C24D50-B70E-6E43-A434-A378B909BA98}" type="datetimeFigureOut">
               <a:rPr lang="en-US" smtClean="0"/>
-              <a:t>9/23/23</a:t>
+              <a:t>9/28/23</a:t>
             </a:fld>
             <a:endParaRPr lang="en-US"/>
           </a:p>
@@ -5668,7 +5669,9 @@
         </p:nvSpPr>
         <p:spPr/>
         <p:txBody>
-          <a:bodyPr/>
+          <a:bodyPr>
+            <a:normAutofit fontScale="70000" lnSpcReduction="20000"/>
+          </a:bodyPr>
           <a:lstStyle/>
           <a:p>
             <a:r>
@@ -5684,7 +5687,7 @@
           </a:p>
           <a:p>
             <a:r>
-              <a:rPr lang="en-US" dirty="0"/>
+              <a:rPr lang="en-US" strike="sngStrike" dirty="0"/>
               <a:t>How to bind programmatic sub-models? Name for model instances!</a:t>
             </a:r>
           </a:p>
@@ -5703,13 +5706,40 @@
           <a:p>
             <a:r>
               <a:rPr lang="en-US" dirty="0"/>
-              <a:t>Leverage bound sub-models to serialize? Can just save all attributes that are bound and/or initialize </a:t>
-            </a:r>
-            <a:r>
-              <a:rPr lang="en-US"/>
-              <a:t>solver state</a:t>
-            </a:r>
-            <a:endParaRPr lang="en-US" dirty="0"/>
+              <a:t>Leverage bound sub-models to serialize? Can just save all attributes that are bound and/or initialize solver state</a:t>
+            </a:r>
+          </a:p>
+          <a:p>
+            <a:r>
+              <a:rPr lang="en-US" dirty="0"/>
+              <a:t>Make implementation layer backend agnostic by forcing compile evaluator (callback/op), </a:t>
+            </a:r>
+          </a:p>
+          <a:p>
+            <a:r>
+              <a:rPr lang="en-US" dirty="0"/>
+              <a:t>Symbolic layer between model and backend for backend-agnostic symbolic manipulations?</a:t>
+            </a:r>
+          </a:p>
+          <a:p>
+            <a:r>
+              <a:rPr lang="en-US" dirty="0"/>
+              <a:t>Serialization? Easy save program state.</a:t>
+            </a:r>
+          </a:p>
+          <a:p>
+            <a:r>
+              <a:rPr lang="en-US" dirty="0"/>
+              <a:t>Add </a:t>
+            </a:r>
+            <a:r>
+              <a:rPr lang="en-US" dirty="0" err="1"/>
+              <a:t>bind_sub_model</a:t>
+            </a:r>
+            <a:r>
+              <a:rPr lang="en-US" dirty="0"/>
+              <a:t> flag (back) to model meta?</a:t>
+            </a:r>
           </a:p>
           <a:p>
             <a:endParaRPr lang="en-US" dirty="0"/>
@@ -6229,6 +6259,194 @@
     <p:extLst>
       <p:ext uri="{BB962C8B-B14F-4D97-AF65-F5344CB8AC3E}">
         <p14:creationId xmlns:p14="http://schemas.microsoft.com/office/powerpoint/2010/main" val="611900226"/>
+      </p:ext>
+    </p:extLst>
+  </p:cSld>
+  <p:clrMapOvr>
+    <a:masterClrMapping/>
+  </p:clrMapOvr>
+</p:sld>
+</file>
+
+<file path=ppt/slides/slide18.xml><?xml version="1.0" encoding="utf-8"?>
+<p:sld xmlns:a="http://schemas.openxmlformats.org/drawingml/2006/main" xmlns:r="http://schemas.openxmlformats.org/officeDocument/2006/relationships" xmlns:p="http://schemas.openxmlformats.org/presentationml/2006/main">
+  <p:cSld>
+    <p:spTree>
+      <p:nvGrpSpPr>
+        <p:cNvPr id="1" name=""/>
+        <p:cNvGrpSpPr/>
+        <p:nvPr/>
+      </p:nvGrpSpPr>
+      <p:grpSpPr>
+        <a:xfrm>
+          <a:off x="0" y="0"/>
+          <a:ext cx="0" cy="0"/>
+          <a:chOff x="0" y="0"/>
+          <a:chExt cx="0" cy="0"/>
+        </a:xfrm>
+      </p:grpSpPr>
+      <p:sp>
+        <p:nvSpPr>
+          <p:cNvPr id="2" name="Title 1">
+            <a:extLst>
+              <a:ext uri="{FF2B5EF4-FFF2-40B4-BE49-F238E27FC236}">
+                <a16:creationId xmlns:a16="http://schemas.microsoft.com/office/drawing/2014/main" id="{5367946B-062B-E299-C3A1-0A958ACDF820}"/>
+              </a:ext>
+            </a:extLst>
+          </p:cNvPr>
+          <p:cNvSpPr>
+            <a:spLocks noGrp="1"/>
+          </p:cNvSpPr>
+          <p:nvPr>
+            <p:ph type="title"/>
+          </p:nvPr>
+        </p:nvSpPr>
+        <p:spPr/>
+        <p:txBody>
+          <a:bodyPr/>
+          <a:lstStyle/>
+          <a:p>
+            <a:endParaRPr lang="en-US"/>
+          </a:p>
+        </p:txBody>
+      </p:sp>
+      <p:sp>
+        <p:nvSpPr>
+          <p:cNvPr id="3" name="Content Placeholder 2">
+            <a:extLst>
+              <a:ext uri="{FF2B5EF4-FFF2-40B4-BE49-F238E27FC236}">
+                <a16:creationId xmlns:a16="http://schemas.microsoft.com/office/drawing/2014/main" id="{D0DDA58B-BBF6-FD38-63C8-9CF6F88A2D02}"/>
+              </a:ext>
+            </a:extLst>
+          </p:cNvPr>
+          <p:cNvSpPr>
+            <a:spLocks noGrp="1"/>
+          </p:cNvSpPr>
+          <p:nvPr>
+            <p:ph idx="1"/>
+          </p:nvPr>
+        </p:nvSpPr>
+        <p:spPr/>
+        <p:txBody>
+          <a:bodyPr>
+            <a:normAutofit fontScale="70000" lnSpcReduction="20000"/>
+          </a:bodyPr>
+          <a:lstStyle/>
+          <a:p>
+            <a:r>
+              <a:rPr lang="en-US" dirty="0"/>
+              <a:t>Try removing clipping and using </a:t>
+            </a:r>
+            <a:r>
+              <a:rPr lang="en-US" dirty="0" err="1"/>
+              <a:t>implicit_output's</a:t>
+            </a:r>
+            <a:r>
+              <a:rPr lang="en-US" dirty="0"/>
+              <a:t> </a:t>
+            </a:r>
+            <a:r>
+              <a:rPr lang="en-US" dirty="0" err="1"/>
+              <a:t>lower_bound</a:t>
+            </a:r>
+            <a:r>
+              <a:rPr lang="en-US" dirty="0"/>
+              <a:t> to enforce positive solution</a:t>
+            </a:r>
+          </a:p>
+          <a:p>
+            <a:r>
+              <a:rPr lang="en-US" dirty="0"/>
+              <a:t>and/or as an optimization problem</a:t>
+            </a:r>
+          </a:p>
+          <a:p>
+            <a:r>
+              <a:rPr lang="en-US" dirty="0"/>
+              <a:t>ascent controller as optimization problem</a:t>
+            </a:r>
+          </a:p>
+          <a:p>
+            <a:r>
+              <a:rPr lang="en-US" dirty="0"/>
+              <a:t>Clean up trajectory? lol</a:t>
+            </a:r>
+          </a:p>
+          <a:p>
+            <a:r>
+              <a:rPr lang="en-US" dirty="0"/>
+              <a:t>Add CL alpha calculation (See Dahlia/Carl chat)</a:t>
+            </a:r>
+          </a:p>
+          <a:p>
+            <a:r>
+              <a:rPr lang="en-US" strike="sngStrike" dirty="0"/>
+              <a:t>Add VROT calculation to statics</a:t>
+            </a:r>
+          </a:p>
+          <a:p>
+            <a:r>
+              <a:rPr lang="en-US" dirty="0"/>
+              <a:t>condor import settings for </a:t>
+            </a:r>
+            <a:r>
+              <a:rPr lang="en-US" dirty="0" err="1"/>
+              <a:t>GasconAnalysis</a:t>
+            </a:r>
+            <a:r>
+              <a:rPr lang="en-US" dirty="0"/>
+              <a:t> to make sure it is using the correct engine deck</a:t>
+            </a:r>
+          </a:p>
+          <a:p>
+            <a:r>
+              <a:rPr lang="en-US" dirty="0"/>
+              <a:t>refactor to use for-loop promotion pattern, make variable names more consistent</a:t>
+            </a:r>
+          </a:p>
+          <a:p>
+            <a:r>
+              <a:rPr lang="en-US" dirty="0"/>
+              <a:t>Aero form factors computation</a:t>
+            </a:r>
+          </a:p>
+          <a:p>
+            <a:r>
+              <a:rPr lang="en-US" dirty="0"/>
+              <a:t>Other GITHUB </a:t>
+            </a:r>
+            <a:r>
+              <a:rPr lang="en-US" dirty="0" err="1"/>
+              <a:t>Gaspy</a:t>
+            </a:r>
+            <a:r>
+              <a:rPr lang="en-US" dirty="0"/>
+              <a:t> </a:t>
+            </a:r>
+            <a:r>
+              <a:rPr lang="en-US" dirty="0" err="1"/>
+              <a:t>todo</a:t>
+            </a:r>
+            <a:endParaRPr lang="en-US" dirty="0"/>
+          </a:p>
+          <a:p>
+            <a:r>
+              <a:rPr lang="en-US" dirty="0"/>
+              <a:t>Propeller idle</a:t>
+            </a:r>
+          </a:p>
+          <a:p>
+            <a:endParaRPr lang="en-US" dirty="0"/>
+          </a:p>
+          <a:p>
+            <a:endParaRPr lang="en-US" dirty="0"/>
+          </a:p>
+        </p:txBody>
+      </p:sp>
+    </p:spTree>
+    <p:extLst>
+      <p:ext uri="{BB962C8B-B14F-4D97-AF65-F5344CB8AC3E}">
+        <p14:creationId xmlns:p14="http://schemas.microsoft.com/office/powerpoint/2010/main" val="3784256872"/>
       </p:ext>
     </p:extLst>
   </p:cSld>

</xml_diff>